<commit_message>
Adding git-url to presentation
</commit_message>
<xml_diff>
--- a/project-presentation.pptx
+++ b/project-presentation.pptx
@@ -10883,13 +10883,13 @@
         </p:nvSpPr>
         <p:spPr>
           <a:xfrm>
-            <a:off x="677334" y="2999874"/>
-            <a:ext cx="8596668" cy="2085474"/>
+            <a:off x="677334" y="2910980"/>
+            <a:ext cx="8596668" cy="2223082"/>
           </a:xfrm>
         </p:spPr>
         <p:txBody>
           <a:bodyPr>
-            <a:normAutofit lnSpcReduction="10000"/>
+            <a:normAutofit fontScale="77500" lnSpcReduction="20000"/>
           </a:bodyPr>
           <a:lstStyle/>
           <a:p>
@@ -10909,6 +10909,31 @@
               <a:rPr lang="en-US" sz="3100" dirty="0"/>
               <a:t>Project in Sparse Representations in Signal and Image Processing – 236862 by Prof. Michael Elad </a:t>
             </a:r>
+          </a:p>
+          <a:p>
+            <a:pPr marL="0" indent="0" algn="l">
+              <a:buNone/>
+            </a:pPr>
+            <a:r>
+              <a:rPr lang="en-US" sz="3200" dirty="0">
+                <a:solidFill>
+                  <a:schemeClr val="accent3"/>
+                </a:solidFill>
+                <a:hlinkClick r:id="rId2">
+                  <a:extLst>
+                    <a:ext uri="{A12FA001-AC4F-418D-AE19-62706E023703}">
+                      <ahyp:hlinkClr xmlns:ahyp="http://schemas.microsoft.com/office/drawing/2018/hyperlinkcolor" val="tx"/>
+                    </a:ext>
+                  </a:extLst>
+                </a:hlinkClick>
+              </a:rPr>
+              <a:t>https://github.com/neryah/PATCH-DISAGREEMENT-AS-A-WAY-TO-IMPROVE-K-SVD-DENOISING-implementation-and-improvement</a:t>
+            </a:r>
+            <a:endParaRPr lang="he-IL" sz="3200" dirty="0">
+              <a:solidFill>
+                <a:schemeClr val="accent3"/>
+              </a:solidFill>
+            </a:endParaRPr>
           </a:p>
           <a:p>
             <a:pPr algn="l"/>
@@ -22625,8 +22650,8 @@
           </a:p>
         </p:txBody>
       </p:sp>
-      <mc:AlternateContent xmlns:mc="http://schemas.openxmlformats.org/markup-compatibility/2006">
-        <mc:Choice xmlns:a14="http://schemas.microsoft.com/office/drawing/2010/main" Requires="a14">
+      <mc:AlternateContent xmlns:mc="http://schemas.openxmlformats.org/markup-compatibility/2006" xmlns:a14="http://schemas.microsoft.com/office/drawing/2010/main">
+        <mc:Choice Requires="a14">
           <p:sp>
             <p:nvSpPr>
               <p:cNvPr id="12" name="Content Placeholder 11">
@@ -22790,7 +22815,7 @@
             </p:txBody>
           </p:sp>
         </mc:Choice>
-        <mc:Fallback>
+        <mc:Fallback xmlns="">
           <p:sp>
             <p:nvSpPr>
               <p:cNvPr id="12" name="Content Placeholder 11">
@@ -26258,14 +26283,18 @@
             </a:r>
             <a:r>
               <a:rPr lang="en-US" dirty="0"/>
-              <a:t>future directions</a:t>
+              <a:t>future directions and </a:t>
+            </a:r>
+            <a:r>
+              <a:rPr lang="en-US" dirty="0" err="1"/>
+              <a:t>url</a:t>
             </a:r>
             <a:endParaRPr lang="he-IL" dirty="0"/>
           </a:p>
         </p:txBody>
       </p:sp>
-      <mc:AlternateContent xmlns:mc="http://schemas.openxmlformats.org/markup-compatibility/2006" xmlns:a14="http://schemas.microsoft.com/office/drawing/2010/main">
-        <mc:Choice Requires="a14">
+      <mc:AlternateContent xmlns:mc="http://schemas.openxmlformats.org/markup-compatibility/2006">
+        <mc:Choice xmlns:a14="http://schemas.microsoft.com/office/drawing/2010/main" Requires="a14">
           <p:sp>
             <p:nvSpPr>
               <p:cNvPr id="3" name="מציין מיקום תוכן 2">
@@ -26397,12 +26426,43 @@
                 <a:pPr marL="0" indent="0" algn="l" rtl="0">
                   <a:buNone/>
                 </a:pPr>
+                <a:endParaRPr lang="en-US" dirty="0"/>
+              </a:p>
+              <a:p>
+                <a:pPr marL="0" indent="0" algn="l" rtl="0">
+                  <a:buNone/>
+                </a:pPr>
+                <a:r>
+                  <a:rPr lang="en-US" sz="2000" dirty="0">
+                    <a:solidFill>
+                      <a:srgbClr val="FFC000"/>
+                    </a:solidFill>
+                  </a:rPr>
+                  <a:t>All the work is on the next URL:</a:t>
+                </a:r>
+              </a:p>
+              <a:p>
+                <a:pPr marL="0" indent="0" algn="l" rtl="0">
+                  <a:buNone/>
+                </a:pPr>
+                <a:r>
+                  <a:rPr lang="en-US" sz="2000" dirty="0">
+                    <a:hlinkClick r:id="rId2"/>
+                  </a:rPr>
+                  <a:t>https://github.com/neryah/PATCH-DISAGREEMENT-AS-A-WAY-TO-IMPROVE-K-SVD-DENOISING-implementation-and-improvement</a:t>
+                </a:r>
+                <a:endParaRPr lang="he-IL" sz="2000" dirty="0"/>
+              </a:p>
+              <a:p>
+                <a:pPr marL="0" indent="0" algn="l" rtl="0">
+                  <a:buNone/>
+                </a:pPr>
                 <a:endParaRPr lang="he-IL" dirty="0"/>
               </a:p>
             </p:txBody>
           </p:sp>
         </mc:Choice>
-        <mc:Fallback xmlns="">
+        <mc:Fallback>
           <p:sp>
             <p:nvSpPr>
               <p:cNvPr id="3" name="מציין מיקום תוכן 2">
@@ -26421,9 +26481,9 @@
             </p:nvSpPr>
             <p:spPr>
               <a:blipFill>
-                <a:blip r:embed="rId2"/>
+                <a:blip r:embed="rId3"/>
                 <a:stretch>
-                  <a:fillRect l="-567" t="-942"/>
+                  <a:fillRect l="-709" t="-942" b="-4553"/>
                 </a:stretch>
               </a:blipFill>
             </p:spPr>

</xml_diff>